<commit_message>
feat: Introduce `ppt_shared` module to programmatically generate PowerPoint presentations with custom slides, tables, and charts.
</commit_message>
<xml_diff>
--- a/test_compare_full.pptx
+++ b/test_compare_full.pptx
@@ -348,7 +348,7 @@
       </c:valAx>
     </c:plotArea>
     <c:legend>
-      <c:legendPos val="b"/>
+      <c:legendPos/>
       <c:layout/>
       <c:overlay val="1"/>
       <c:txPr>
@@ -356,7 +356,7 @@
         <a:lstStyle/>
         <a:p>
           <a:pPr>
-            <a:defRPr sz="900">
+            <a:defRPr sz="1000">
               <a:latin typeface="Avenir Medium"/>
             </a:defRPr>
           </a:pPr>

</xml_diff>

<commit_message>
feat: Add `ppt_shared.py` module to centralize PowerPoint slide, table, and chart generation utilities, and update `test_compare_full.pptx`.
</commit_message>
<xml_diff>
--- a/test_compare_full.pptx
+++ b/test_compare_full.pptx
@@ -348,7 +348,7 @@
       </c:valAx>
     </c:plotArea>
     <c:legend>
-      <c:legendPos/>
+      <c:legendPos val="b"/>
       <c:layout/>
       <c:overlay val="1"/>
       <c:txPr>
@@ -356,7 +356,7 @@
         <a:lstStyle/>
         <a:p>
           <a:pPr>
-            <a:defRPr sz="1000">
+            <a:defRPr sz="900">
               <a:latin typeface="Avenir Medium"/>
             </a:defRPr>
           </a:pPr>

</xml_diff>